<commit_message>
some poster changes and signoff
</commit_message>
<xml_diff>
--- a/Intern-Logs/Poster_final.pptx
+++ b/Intern-Logs/Poster_final.pptx
@@ -1137,7 +1137,7 @@
                   <a:srgbClr val="00131D"/>
                 </a:solidFill>
               </a:rPr>
-              <a:t>Figure 6: EDTs for the five rooms, related to the estimated RIRs in VR environment. The dashed lines show the JND limit of 5% (</a:t>
+              <a:t>Figure 6: Early Decay Times for the five rooms, related to the estimated RIRs in VR environment. The dashed lines show the JND limit of 5% (</a:t>
             </a:r>
             <a:r>
               <a:rPr lang="en-US" sz="2400" dirty="0" err="1">
@@ -1329,7 +1329,7 @@
           <a:p>
             <a:pPr algn="ctr"/>
             <a:r>
-              <a:rPr lang="en-US" dirty="0">
+              <a:rPr lang="en-US" u="sng" dirty="0">
                 <a:ln w="0"/>
                 <a:solidFill>
                   <a:schemeClr val="tx2"/>
@@ -1342,9 +1342,9 @@
                   </a:outerShdw>
                 </a:effectLst>
               </a:rPr>
-              <a:t>Results</a:t>
-            </a:r>
-            <a:endParaRPr lang="en-GB" dirty="0">
+              <a:t>Audio Evaluation Results</a:t>
+            </a:r>
+            <a:endParaRPr lang="en-GB" u="sng" dirty="0">
               <a:solidFill>
                 <a:schemeClr val="tx2"/>
               </a:solidFill>
@@ -1426,7 +1426,7 @@
                   <a:srgbClr val="00131D"/>
                 </a:solidFill>
               </a:rPr>
-              <a:t>Figure 7: RT60s for the five rooms, related to the estimated RIRs in VR environment. The dashed lines show the JND limit of 20% (Meng et al. 2006).</a:t>
+              <a:t>Figure 7: Reverberation Times (60dB) for the five rooms, related to the estimated RIRs in VR environment. The dashed lines show the JND limit of 20% (Meng et al. 2006).</a:t>
             </a:r>
             <a:endParaRPr lang="en-GB" sz="2400" dirty="0">
               <a:solidFill>
@@ -1594,7 +1594,7 @@
                   <a:srgbClr val="00131D"/>
                 </a:solidFill>
               </a:rPr>
-              <a:t>Fig 4: Original image of Kitchen indoor room scene.</a:t>
+              <a:t>Fig 4:Input image of Kitchen indoor room scene. </a:t>
             </a:r>
             <a:endParaRPr lang="en-GB" sz="2400" dirty="0">
               <a:solidFill>
@@ -1682,7 +1682,7 @@
                   <a:srgbClr val="00131D"/>
                 </a:solidFill>
               </a:rPr>
-              <a:t>Fig 3 (left): The GUI app for the pipeline, which is only few clicks after setup is done properly.</a:t>
+              <a:t>Fig 3 (left): The GUI app for the pipeline, which is only a few clicks provided setup is done properly.</a:t>
             </a:r>
             <a:endParaRPr lang="en-GB" sz="2400" dirty="0">
               <a:solidFill>
@@ -1817,7 +1817,7 @@
         </p:blipFill>
         <p:spPr bwMode="auto">
           <a:xfrm>
-            <a:off x="16111727" y="8195456"/>
+            <a:off x="15893801" y="8195456"/>
             <a:ext cx="4141010" cy="4141010"/>
           </a:xfrm>
           <a:prstGeom prst="rect">

</xml_diff>